<commit_message>
finished updates to ensure operational path of download->cache->compute_count->generate_csv
</commit_message>
<xml_diff>
--- a/presentaion_resources/Categorical Email Classification Tool.pptx
+++ b/presentaion_resources/Categorical Email Classification Tool.pptx
@@ -216,7 +216,7 @@
           <a:p>
             <a:fld id="{A775BF00-5A46-46E4-AF9B-DCC25FC1AB60}" type="datetimeFigureOut">
               <a:rPr lang="en-US" smtClean="0"/>
-              <a:t>1/29/2021</a:t>
+              <a:t>4/12/2021</a:t>
             </a:fld>
             <a:endParaRPr lang="en-US"/>
           </a:p>
@@ -1121,7 +1121,7 @@
           <a:p>
             <a:fld id="{9184DA70-C731-4C70-880D-CCD4705E623C}" type="datetime1">
               <a:rPr lang="en-US" smtClean="0"/>
-              <a:t>1/29/2021</a:t>
+              <a:t>4/12/2021</a:t>
             </a:fld>
             <a:endParaRPr lang="en-US" dirty="0"/>
           </a:p>
@@ -1309,7 +1309,7 @@
           <a:p>
             <a:fld id="{4BE1D723-8F53-4F53-90B0-1982A396982E}" type="datetime1">
               <a:rPr lang="en-US" smtClean="0"/>
-              <a:t>1/29/2021</a:t>
+              <a:t>4/12/2021</a:t>
             </a:fld>
             <a:endParaRPr lang="en-US" dirty="0"/>
           </a:p>
@@ -1682,7 +1682,7 @@
           <a:p>
             <a:fld id="{97669AF7-7BEB-44E4-9852-375E34362B5B}" type="datetime1">
               <a:rPr lang="en-US" smtClean="0"/>
-              <a:t>1/29/2021</a:t>
+              <a:t>4/12/2021</a:t>
             </a:fld>
             <a:endParaRPr lang="en-US" dirty="0"/>
           </a:p>
@@ -1937,7 +1937,7 @@
           <a:p>
             <a:fld id="{BAAAC38D-0552-4C82-B593-E6124DFADBE2}" type="datetime1">
               <a:rPr lang="en-US" smtClean="0"/>
-              <a:t>1/29/2021</a:t>
+              <a:t>4/12/2021</a:t>
             </a:fld>
             <a:endParaRPr lang="en-US" dirty="0"/>
           </a:p>
@@ -2334,7 +2334,7 @@
           <a:p>
             <a:fld id="{D9DF0F1C-5577-4ACB-BB62-DF8F3C494C7E}" type="datetime1">
               <a:rPr lang="en-US" smtClean="0"/>
-              <a:t>1/29/2021</a:t>
+              <a:t>4/12/2021</a:t>
             </a:fld>
             <a:endParaRPr lang="en-US" dirty="0"/>
           </a:p>
@@ -2470,7 +2470,7 @@
           <a:p>
             <a:fld id="{1775B394-D9F9-4F0C-B15D-605F45CB9E9F}" type="datetime1">
               <a:rPr lang="en-US" smtClean="0"/>
-              <a:t>1/29/2021</a:t>
+              <a:t>4/12/2021</a:t>
             </a:fld>
             <a:endParaRPr lang="en-US" dirty="0"/>
           </a:p>
@@ -2627,7 +2627,7 @@
           <a:p>
             <a:fld id="{39667345-2558-425A-8533-9BFDBCE15005}" type="datetime1">
               <a:rPr lang="en-US" smtClean="0"/>
-              <a:t>1/29/2021</a:t>
+              <a:t>4/12/2021</a:t>
             </a:fld>
             <a:endParaRPr lang="en-US" dirty="0"/>
           </a:p>
@@ -2956,7 +2956,7 @@
           <a:p>
             <a:fld id="{92BEA474-078D-4E9B-9B14-09A87B19DC46}" type="datetime1">
               <a:rPr lang="en-US" smtClean="0"/>
-              <a:t>1/29/2021</a:t>
+              <a:t>4/12/2021</a:t>
             </a:fld>
             <a:endParaRPr lang="en-US" dirty="0"/>
           </a:p>
@@ -3306,7 +3306,7 @@
           <a:p>
             <a:fld id="{4907D986-8816-4272-A432-0437A28A9828}" type="datetime1">
               <a:rPr lang="en-US" smtClean="0"/>
-              <a:t>1/29/2021</a:t>
+              <a:t>4/12/2021</a:t>
             </a:fld>
             <a:endParaRPr lang="en-US" dirty="0"/>
           </a:p>
@@ -3567,7 +3567,7 @@
           <a:p>
             <a:fld id="{62D6E202-B606-4609-B914-27C9371A1F6D}" type="datetime1">
               <a:rPr lang="en-US" smtClean="0"/>
-              <a:t>1/29/2021</a:t>
+              <a:t>4/12/2021</a:t>
             </a:fld>
             <a:endParaRPr lang="en-US" dirty="0"/>
           </a:p>
@@ -5247,8 +5247,81 @@
             </a:pPr>
             <a:r>
               <a:rPr lang="en-US" dirty="0"/>
-              <a:t>NLTK:</a:t>
-            </a:r>
+              <a:t>NLTK	-- Natural Language Processing tools.</a:t>
+            </a:r>
+          </a:p>
+          <a:p>
+            <a:pPr lvl="2">
+              <a:buFont typeface="Arial" panose="020B0604020202020204" pitchFamily="34" charset="0"/>
+              <a:buChar char="•"/>
+            </a:pPr>
+            <a:r>
+              <a:rPr lang="en-US" dirty="0"/>
+              <a:t>SQLite 3  	-- SQL bindings wrapper for database implementation in Python.</a:t>
+            </a:r>
+          </a:p>
+          <a:p>
+            <a:pPr lvl="2">
+              <a:buFont typeface="Arial" panose="020B0604020202020204" pitchFamily="34" charset="0"/>
+              <a:buChar char="•"/>
+            </a:pPr>
+            <a:r>
+              <a:rPr lang="en-US" dirty="0"/>
+              <a:t>Doit		-- Multi-stage task automation package that orchestrates the automated execution of the project’s sub-modules.</a:t>
+            </a:r>
+          </a:p>
+          <a:p>
+            <a:pPr lvl="2">
+              <a:buFont typeface="Arial" panose="020B0604020202020204" pitchFamily="34" charset="0"/>
+              <a:buChar char="•"/>
+            </a:pPr>
+            <a:r>
+              <a:rPr lang="en-US" dirty="0"/>
+              <a:t>Pandas	-- Data exploration package used in diagnostic evaluation of word counts and NLP tools as project is developed.</a:t>
+            </a:r>
+          </a:p>
+          <a:p>
+            <a:pPr lvl="2">
+              <a:buFont typeface="Arial" panose="020B0604020202020204" pitchFamily="34" charset="0"/>
+              <a:buChar char="•"/>
+            </a:pPr>
+            <a:r>
+              <a:rPr lang="en-US" dirty="0" err="1"/>
+              <a:t>Numpy</a:t>
+            </a:r>
+            <a:r>
+              <a:rPr lang="en-US" dirty="0"/>
+              <a:t>	-- Efficient data containers and optimized data manipulation algorithms.</a:t>
+            </a:r>
+          </a:p>
+          <a:p>
+            <a:pPr lvl="2">
+              <a:buFont typeface="Arial" panose="020B0604020202020204" pitchFamily="34" charset="0"/>
+              <a:buChar char="•"/>
+            </a:pPr>
+            <a:r>
+              <a:rPr lang="en-US" dirty="0" err="1"/>
+              <a:t>Numba</a:t>
+            </a:r>
+            <a:r>
+              <a:rPr lang="en-US" dirty="0"/>
+              <a:t>	-- JIT compilation of arbitrary python code to significantly faster </a:t>
+            </a:r>
+            <a:r>
+              <a:rPr lang="en-US" dirty="0" err="1"/>
+              <a:t>c++</a:t>
+            </a:r>
+            <a:r>
+              <a:rPr lang="en-US" dirty="0"/>
+              <a:t> representations.</a:t>
+            </a:r>
+          </a:p>
+          <a:p>
+            <a:pPr lvl="2">
+              <a:buFont typeface="Arial" panose="020B0604020202020204" pitchFamily="34" charset="0"/>
+              <a:buChar char="•"/>
+            </a:pPr>
+            <a:endParaRPr lang="en-US" dirty="0"/>
           </a:p>
           <a:p>
             <a:pPr lvl="2">
@@ -6255,24 +6328,6 @@
 </file>
 
 <file path=customXml/item1.xml><?xml version="1.0" encoding="utf-8"?>
-<p:properties xmlns:p="http://schemas.microsoft.com/office/2006/metadata/properties" xmlns:xsi="http://www.w3.org/2001/XMLSchema-instance" xmlns:pc="http://schemas.microsoft.com/office/infopath/2007/PartnerControls">
-  <documentManagement>
-    <Status xmlns="71af3243-3dd4-4a8d-8c0d-dd76da1f02a5">Not started</Status>
-    <MediaServiceKeyPoints xmlns="71af3243-3dd4-4a8d-8c0d-dd76da1f02a5" xsi:nil="true"/>
-  </documentManagement>
-</p:properties>
-</file>
-
-<file path=customXml/item2.xml><?xml version="1.0" encoding="utf-8"?>
-<?mso-contentType ?>
-<FormTemplates xmlns="http://schemas.microsoft.com/sharepoint/v3/contenttype/forms">
-  <Display>DocumentLibraryForm</Display>
-  <Edit>DocumentLibraryForm</Edit>
-  <New>DocumentLibraryForm</New>
-</FormTemplates>
-</file>
-
-<file path=customXml/item3.xml><?xml version="1.0" encoding="utf-8"?>
 <ct:contentTypeSchema xmlns:ct="http://schemas.microsoft.com/office/2006/metadata/contentType" xmlns:ma="http://schemas.microsoft.com/office/2006/metadata/properties/metaAttributes" ct:_="" ma:_="" ma:contentTypeName="Document" ma:contentTypeID="0x01010079F111ED35F8CC479449609E8A0923A6" ma:contentTypeVersion="12" ma:contentTypeDescription="Create a new document." ma:contentTypeScope="" ma:versionID="a410dd7f93c95333ffa1b60ed6adedd1">
   <xsd:schema xmlns:xsd="http://www.w3.org/2001/XMLSchema" xmlns:xs="http://www.w3.org/2001/XMLSchema" xmlns:p="http://schemas.microsoft.com/office/2006/metadata/properties" xmlns:ns2="71af3243-3dd4-4a8d-8c0d-dd76da1f02a5" xmlns:ns3="16c05727-aa75-4e4a-9b5f-8a80a1165891" targetNamespace="http://schemas.microsoft.com/office/2006/metadata/properties" ma:root="true" ma:fieldsID="a936d9baba76aa3866493feff160faab" ns2:_="" ns3:_="">
     <xsd:import namespace="71af3243-3dd4-4a8d-8c0d-dd76da1f02a5"/>
@@ -6493,25 +6548,25 @@
 </ct:contentTypeSchema>
 </file>
 
-<file path=customXml/itemProps1.xml><?xml version="1.0" encoding="utf-8"?>
-<ds:datastoreItem xmlns:ds="http://schemas.openxmlformats.org/officeDocument/2006/customXml" ds:itemID="{A03EEFF0-FB57-4CB4-8BFC-DF397689E2ED}">
-  <ds:schemaRefs>
-    <ds:schemaRef ds:uri="http://schemas.microsoft.com/office/2006/metadata/properties"/>
-    <ds:schemaRef ds:uri="http://schemas.microsoft.com/office/infopath/2007/PartnerControls"/>
-    <ds:schemaRef ds:uri="71af3243-3dd4-4a8d-8c0d-dd76da1f02a5"/>
-  </ds:schemaRefs>
-</ds:datastoreItem>
+<file path=customXml/item2.xml><?xml version="1.0" encoding="utf-8"?>
+<?mso-contentType ?>
+<FormTemplates xmlns="http://schemas.microsoft.com/sharepoint/v3/contenttype/forms">
+  <Display>DocumentLibraryForm</Display>
+  <Edit>DocumentLibraryForm</Edit>
+  <New>DocumentLibraryForm</New>
+</FormTemplates>
 </file>
 
-<file path=customXml/itemProps2.xml><?xml version="1.0" encoding="utf-8"?>
-<ds:datastoreItem xmlns:ds="http://schemas.openxmlformats.org/officeDocument/2006/customXml" ds:itemID="{AA3F7EDC-E5B4-4BBC-9D2A-CBE6D46C37AD}">
-  <ds:schemaRefs>
-    <ds:schemaRef ds:uri="http://schemas.microsoft.com/sharepoint/v3/contenttype/forms"/>
-  </ds:schemaRefs>
-</ds:datastoreItem>
+<file path=customXml/item3.xml><?xml version="1.0" encoding="utf-8"?>
+<p:properties xmlns:p="http://schemas.microsoft.com/office/2006/metadata/properties" xmlns:xsi="http://www.w3.org/2001/XMLSchema-instance" xmlns:pc="http://schemas.microsoft.com/office/infopath/2007/PartnerControls">
+  <documentManagement>
+    <Status xmlns="71af3243-3dd4-4a8d-8c0d-dd76da1f02a5">Not started</Status>
+    <MediaServiceKeyPoints xmlns="71af3243-3dd4-4a8d-8c0d-dd76da1f02a5" xsi:nil="true"/>
+  </documentManagement>
+</p:properties>
 </file>
 
-<file path=customXml/itemProps3.xml><?xml version="1.0" encoding="utf-8"?>
+<file path=customXml/itemProps1.xml><?xml version="1.0" encoding="utf-8"?>
 <ds:datastoreItem xmlns:ds="http://schemas.openxmlformats.org/officeDocument/2006/customXml" ds:itemID="{93932EF5-314F-409E-8020-FEE5FA0795B9}">
   <ds:schemaRefs>
     <ds:schemaRef ds:uri="http://schemas.microsoft.com/office/2006/metadata/contentType"/>
@@ -6528,4 +6583,22 @@
     <ds:schemaRef ds:uri="http://schemas.microsoft.com/internal/obd"/>
   </ds:schemaRefs>
 </ds:datastoreItem>
+</file>
+
+<file path=customXml/itemProps2.xml><?xml version="1.0" encoding="utf-8"?>
+<ds:datastoreItem xmlns:ds="http://schemas.openxmlformats.org/officeDocument/2006/customXml" ds:itemID="{AA3F7EDC-E5B4-4BBC-9D2A-CBE6D46C37AD}">
+  <ds:schemaRefs>
+    <ds:schemaRef ds:uri="http://schemas.microsoft.com/sharepoint/v3/contenttype/forms"/>
+  </ds:schemaRefs>
+</ds:datastoreItem>
+</file>
+
+<file path=customXml/itemProps3.xml><?xml version="1.0" encoding="utf-8"?>
+<ds:datastoreItem xmlns:ds="http://schemas.openxmlformats.org/officeDocument/2006/customXml" ds:itemID="{A03EEFF0-FB57-4CB4-8BFC-DF397689E2ED}">
+  <ds:schemaRefs>
+    <ds:schemaRef ds:uri="http://schemas.microsoft.com/office/2006/metadata/properties"/>
+    <ds:schemaRef ds:uri="http://schemas.microsoft.com/office/infopath/2007/PartnerControls"/>
+    <ds:schemaRef ds:uri="71af3243-3dd4-4a8d-8c0d-dd76da1f02a5"/>
+  </ds:schemaRefs>
+</ds:datastoreItem>
 </file>
</xml_diff>

<commit_message>
lots of changes... Finished DB pipeline tools, and now wrapping up encapsulation of submodules.
</commit_message>
<xml_diff>
--- a/presentaion_resources/Categorical Email Classification Tool.pptx
+++ b/presentaion_resources/Categorical Email Classification Tool.pptx
@@ -5,17 +5,19 @@
     <p:sldMasterId id="2147483660" r:id="rId4"/>
   </p:sldMasterIdLst>
   <p:notesMasterIdLst>
-    <p:notesMasterId r:id="rId13"/>
+    <p:notesMasterId r:id="rId15"/>
   </p:notesMasterIdLst>
   <p:sldIdLst>
     <p:sldId id="298" r:id="rId5"/>
     <p:sldId id="300" r:id="rId6"/>
     <p:sldId id="302" r:id="rId7"/>
-    <p:sldId id="303" r:id="rId8"/>
-    <p:sldId id="304" r:id="rId9"/>
-    <p:sldId id="301" r:id="rId10"/>
-    <p:sldId id="306" r:id="rId11"/>
-    <p:sldId id="305" r:id="rId12"/>
+    <p:sldId id="304" r:id="rId8"/>
+    <p:sldId id="301" r:id="rId9"/>
+    <p:sldId id="306" r:id="rId10"/>
+    <p:sldId id="307" r:id="rId11"/>
+    <p:sldId id="308" r:id="rId12"/>
+    <p:sldId id="305" r:id="rId13"/>
+    <p:sldId id="303" r:id="rId14"/>
   </p:sldIdLst>
   <p:sldSz cx="12192000" cy="6858000"/>
   <p:notesSz cx="6858000" cy="9144000"/>
@@ -118,6 +120,9 @@
     <p:ext uri="{EFAFB233-063F-42B5-8137-9DF3F51BA10A}">
       <p15:sldGuideLst xmlns:p15="http://schemas.microsoft.com/office/powerpoint/2012/main"/>
     </p:ext>
+    <p:ext uri="{2D200454-40CA-4A62-9FC3-DE9A4176ACB9}">
+      <p15:notesGuideLst xmlns:p15="http://schemas.microsoft.com/office/powerpoint/2012/main"/>
+    </p:ext>
   </p:extLst>
 </p:presentation>
 </file>
@@ -216,7 +221,7 @@
           <a:p>
             <a:fld id="{A775BF00-5A46-46E4-AF9B-DCC25FC1AB60}" type="datetimeFigureOut">
               <a:rPr lang="en-US" smtClean="0"/>
-              <a:t>4/12/2021</a:t>
+              <a:t>5/25/2021</a:t>
             </a:fld>
             <a:endParaRPr lang="en-US"/>
           </a:p>
@@ -668,7 +673,25 @@
           <a:p>
             <a:r>
               <a:rPr lang="en-US" dirty="0"/>
-              <a:t>We are working towards building a tool that lets a user get into the nuts and bolts of the automation, not an end product that just does it all for them.</a:t>
+              <a:t>Get rid of program start and program end</a:t>
+            </a:r>
+          </a:p>
+          <a:p>
+            <a:endParaRPr lang="en-US" dirty="0"/>
+          </a:p>
+          <a:p>
+            <a:r>
+              <a:rPr lang="en-US" dirty="0"/>
+              <a:t>Get better term for “task decomposition”</a:t>
+            </a:r>
+          </a:p>
+          <a:p>
+            <a:endParaRPr lang="en-US" dirty="0"/>
+          </a:p>
+          <a:p>
+            <a:r>
+              <a:rPr lang="en-US" dirty="0"/>
+              <a:t>	maybe” Project breakdown”</a:t>
             </a:r>
           </a:p>
         </p:txBody>
@@ -690,7 +713,7 @@
           <a:p>
             <a:fld id="{2C34D70D-F2EC-4B92-BC04-6F7F492362DE}" type="slidenum">
               <a:rPr lang="en-US" smtClean="0"/>
-              <a:t>4</a:t>
+              <a:t>5</a:t>
             </a:fld>
             <a:endParaRPr lang="en-US"/>
           </a:p>
@@ -699,7 +722,7 @@
     </p:spTree>
     <p:extLst>
       <p:ext uri="{BB962C8B-B14F-4D97-AF65-F5344CB8AC3E}">
-        <p14:creationId xmlns:p14="http://schemas.microsoft.com/office/powerpoint/2010/main" val="3408731019"/>
+        <p14:creationId xmlns:p14="http://schemas.microsoft.com/office/powerpoint/2010/main" val="977645283"/>
       </p:ext>
     </p:extLst>
   </p:cSld>
@@ -783,7 +806,7 @@
     </p:spTree>
     <p:extLst>
       <p:ext uri="{BB962C8B-B14F-4D97-AF65-F5344CB8AC3E}">
-        <p14:creationId xmlns:p14="http://schemas.microsoft.com/office/powerpoint/2010/main" val="977645283"/>
+        <p14:creationId xmlns:p14="http://schemas.microsoft.com/office/powerpoint/2010/main" val="3952453598"/>
       </p:ext>
     </p:extLst>
   </p:cSld>
@@ -837,7 +860,25 @@
           <a:bodyPr/>
           <a:lstStyle/>
           <a:p>
+            <a:r>
+              <a:rPr lang="en-US" dirty="0"/>
+              <a:t>Things to add to slide:</a:t>
+            </a:r>
+          </a:p>
+          <a:p>
             <a:endParaRPr lang="en-US" dirty="0"/>
+          </a:p>
+          <a:p>
+            <a:r>
+              <a:rPr lang="en-US" dirty="0"/>
+              <a:t>	Say that it’s in R</a:t>
+            </a:r>
+          </a:p>
+          <a:p>
+            <a:r>
+              <a:rPr lang="en-US" dirty="0"/>
+              <a:t>	We can now say we classified emails as well.</a:t>
+            </a:r>
           </a:p>
         </p:txBody>
       </p:sp>
@@ -867,7 +908,94 @@
     </p:spTree>
     <p:extLst>
       <p:ext uri="{BB962C8B-B14F-4D97-AF65-F5344CB8AC3E}">
-        <p14:creationId xmlns:p14="http://schemas.microsoft.com/office/powerpoint/2010/main" val="3952453598"/>
+        <p14:creationId xmlns:p14="http://schemas.microsoft.com/office/powerpoint/2010/main" val="3803548125"/>
+      </p:ext>
+    </p:extLst>
+  </p:cSld>
+  <p:clrMapOvr>
+    <a:masterClrMapping/>
+  </p:clrMapOvr>
+</p:notes>
+</file>
+
+<file path=ppt/notesSlides/notesSlide5.xml><?xml version="1.0" encoding="utf-8"?>
+<p:notes xmlns:a="http://schemas.openxmlformats.org/drawingml/2006/main" xmlns:r="http://schemas.openxmlformats.org/officeDocument/2006/relationships" xmlns:p="http://schemas.openxmlformats.org/presentationml/2006/main">
+  <p:cSld>
+    <p:spTree>
+      <p:nvGrpSpPr>
+        <p:cNvPr id="1" name=""/>
+        <p:cNvGrpSpPr/>
+        <p:nvPr/>
+      </p:nvGrpSpPr>
+      <p:grpSpPr>
+        <a:xfrm>
+          <a:off x="0" y="0"/>
+          <a:ext cx="0" cy="0"/>
+          <a:chOff x="0" y="0"/>
+          <a:chExt cx="0" cy="0"/>
+        </a:xfrm>
+      </p:grpSpPr>
+      <p:sp>
+        <p:nvSpPr>
+          <p:cNvPr id="2" name="Slide Image Placeholder 1"/>
+          <p:cNvSpPr>
+            <a:spLocks noGrp="1" noRot="1" noChangeAspect="1"/>
+          </p:cNvSpPr>
+          <p:nvPr>
+            <p:ph type="sldImg"/>
+          </p:nvPr>
+        </p:nvSpPr>
+        <p:spPr/>
+      </p:sp>
+      <p:sp>
+        <p:nvSpPr>
+          <p:cNvPr id="3" name="Notes Placeholder 2"/>
+          <p:cNvSpPr>
+            <a:spLocks noGrp="1"/>
+          </p:cNvSpPr>
+          <p:nvPr>
+            <p:ph type="body" idx="1"/>
+          </p:nvPr>
+        </p:nvSpPr>
+        <p:spPr/>
+        <p:txBody>
+          <a:bodyPr/>
+          <a:lstStyle/>
+          <a:p>
+            <a:r>
+              <a:rPr lang="en-US" dirty="0"/>
+              <a:t>We are working towards building a tool that lets a user get into the nuts and bolts of the automation, not an end product that just does it all for them.</a:t>
+            </a:r>
+          </a:p>
+        </p:txBody>
+      </p:sp>
+      <p:sp>
+        <p:nvSpPr>
+          <p:cNvPr id="4" name="Slide Number Placeholder 3"/>
+          <p:cNvSpPr>
+            <a:spLocks noGrp="1"/>
+          </p:cNvSpPr>
+          <p:nvPr>
+            <p:ph type="sldNum" sz="quarter" idx="5"/>
+          </p:nvPr>
+        </p:nvSpPr>
+        <p:spPr/>
+        <p:txBody>
+          <a:bodyPr/>
+          <a:lstStyle/>
+          <a:p>
+            <a:fld id="{2C34D70D-F2EC-4B92-BC04-6F7F492362DE}" type="slidenum">
+              <a:rPr lang="en-US" smtClean="0"/>
+              <a:t>10</a:t>
+            </a:fld>
+            <a:endParaRPr lang="en-US"/>
+          </a:p>
+        </p:txBody>
+      </p:sp>
+    </p:spTree>
+    <p:extLst>
+      <p:ext uri="{BB962C8B-B14F-4D97-AF65-F5344CB8AC3E}">
+        <p14:creationId xmlns:p14="http://schemas.microsoft.com/office/powerpoint/2010/main" val="3408731019"/>
       </p:ext>
     </p:extLst>
   </p:cSld>
@@ -1121,7 +1249,7 @@
           <a:p>
             <a:fld id="{9184DA70-C731-4C70-880D-CCD4705E623C}" type="datetime1">
               <a:rPr lang="en-US" smtClean="0"/>
-              <a:t>4/12/2021</a:t>
+              <a:t>5/25/2021</a:t>
             </a:fld>
             <a:endParaRPr lang="en-US" dirty="0"/>
           </a:p>
@@ -1309,7 +1437,7 @@
           <a:p>
             <a:fld id="{4BE1D723-8F53-4F53-90B0-1982A396982E}" type="datetime1">
               <a:rPr lang="en-US" smtClean="0"/>
-              <a:t>4/12/2021</a:t>
+              <a:t>5/25/2021</a:t>
             </a:fld>
             <a:endParaRPr lang="en-US" dirty="0"/>
           </a:p>
@@ -1682,7 +1810,7 @@
           <a:p>
             <a:fld id="{97669AF7-7BEB-44E4-9852-375E34362B5B}" type="datetime1">
               <a:rPr lang="en-US" smtClean="0"/>
-              <a:t>4/12/2021</a:t>
+              <a:t>5/25/2021</a:t>
             </a:fld>
             <a:endParaRPr lang="en-US" dirty="0"/>
           </a:p>
@@ -1937,7 +2065,7 @@
           <a:p>
             <a:fld id="{BAAAC38D-0552-4C82-B593-E6124DFADBE2}" type="datetime1">
               <a:rPr lang="en-US" smtClean="0"/>
-              <a:t>4/12/2021</a:t>
+              <a:t>5/25/2021</a:t>
             </a:fld>
             <a:endParaRPr lang="en-US" dirty="0"/>
           </a:p>
@@ -2334,7 +2462,7 @@
           <a:p>
             <a:fld id="{D9DF0F1C-5577-4ACB-BB62-DF8F3C494C7E}" type="datetime1">
               <a:rPr lang="en-US" smtClean="0"/>
-              <a:t>4/12/2021</a:t>
+              <a:t>5/25/2021</a:t>
             </a:fld>
             <a:endParaRPr lang="en-US" dirty="0"/>
           </a:p>
@@ -2470,7 +2598,7 @@
           <a:p>
             <a:fld id="{1775B394-D9F9-4F0C-B15D-605F45CB9E9F}" type="datetime1">
               <a:rPr lang="en-US" smtClean="0"/>
-              <a:t>4/12/2021</a:t>
+              <a:t>5/25/2021</a:t>
             </a:fld>
             <a:endParaRPr lang="en-US" dirty="0"/>
           </a:p>
@@ -2627,7 +2755,7 @@
           <a:p>
             <a:fld id="{39667345-2558-425A-8533-9BFDBCE15005}" type="datetime1">
               <a:rPr lang="en-US" smtClean="0"/>
-              <a:t>4/12/2021</a:t>
+              <a:t>5/25/2021</a:t>
             </a:fld>
             <a:endParaRPr lang="en-US" dirty="0"/>
           </a:p>
@@ -2956,7 +3084,7 @@
           <a:p>
             <a:fld id="{92BEA474-078D-4E9B-9B14-09A87B19DC46}" type="datetime1">
               <a:rPr lang="en-US" smtClean="0"/>
-              <a:t>4/12/2021</a:t>
+              <a:t>5/25/2021</a:t>
             </a:fld>
             <a:endParaRPr lang="en-US" dirty="0"/>
           </a:p>
@@ -3306,7 +3434,7 @@
           <a:p>
             <a:fld id="{4907D986-8816-4272-A432-0437A28A9828}" type="datetime1">
               <a:rPr lang="en-US" smtClean="0"/>
-              <a:t>4/12/2021</a:t>
+              <a:t>5/25/2021</a:t>
             </a:fld>
             <a:endParaRPr lang="en-US" dirty="0"/>
           </a:p>
@@ -3567,7 +3695,7 @@
           <a:p>
             <a:fld id="{62D6E202-B606-4609-B914-27C9371A1F6D}" type="datetime1">
               <a:rPr lang="en-US" smtClean="0"/>
-              <a:t>4/12/2021</a:t>
+              <a:t>5/25/2021</a:t>
             </a:fld>
             <a:endParaRPr lang="en-US" dirty="0"/>
           </a:p>
@@ -4215,7 +4343,7 @@
         </p:blipFill>
         <p:spPr>
           <a:xfrm>
-            <a:off x="20" y="975"/>
+            <a:off x="3273" y="-12683"/>
             <a:ext cx="12191980" cy="6858000"/>
           </a:xfrm>
           <a:prstGeom prst="rect">
@@ -4335,8 +4463,8 @@
         </p:nvSpPr>
         <p:spPr>
           <a:xfrm>
-            <a:off x="8040130" y="1475234"/>
-            <a:ext cx="3393989" cy="2901694"/>
+            <a:off x="7912607" y="1475234"/>
+            <a:ext cx="3635925" cy="2901694"/>
           </a:xfrm>
         </p:spPr>
         <p:txBody>
@@ -4346,12 +4474,42 @@
           <a:lstStyle/>
           <a:p>
             <a:r>
-              <a:rPr lang="en-US" sz="3600" dirty="0">
+              <a:rPr lang="en-US" sz="3000" dirty="0">
                 <a:solidFill>
                   <a:schemeClr val="tx1"/>
                 </a:solidFill>
               </a:rPr>
-              <a:t>Categorical Email Classification Tool</a:t>
+              <a:t>A.C.M.E.:</a:t>
+            </a:r>
+            <a:br>
+              <a:rPr lang="en-US" sz="3000" dirty="0">
+                <a:solidFill>
+                  <a:schemeClr val="tx1"/>
+                </a:solidFill>
+              </a:rPr>
+            </a:br>
+            <a:r>
+              <a:rPr lang="en-US" sz="3000" dirty="0">
+                <a:solidFill>
+                  <a:schemeClr val="tx1"/>
+                </a:solidFill>
+              </a:rPr>
+              <a:t>Automated Collection and</a:t>
+            </a:r>
+            <a:br>
+              <a:rPr lang="en-US" sz="3000" dirty="0">
+                <a:solidFill>
+                  <a:schemeClr val="tx1"/>
+                </a:solidFill>
+              </a:rPr>
+            </a:br>
+            <a:r>
+              <a:rPr lang="en-US" sz="3000" dirty="0">
+                <a:solidFill>
+                  <a:schemeClr val="tx1"/>
+                </a:solidFill>
+              </a:rPr>
+              <a:t>Manipulation of Email</a:t>
             </a:r>
           </a:p>
         </p:txBody>
@@ -4518,6 +4676,64 @@
 </p:sld>
 </file>
 
+<file path=ppt/slides/slide10.xml><?xml version="1.0" encoding="utf-8"?>
+<p:sld xmlns:a="http://schemas.openxmlformats.org/drawingml/2006/main" xmlns:r="http://schemas.openxmlformats.org/officeDocument/2006/relationships" xmlns:p="http://schemas.openxmlformats.org/presentationml/2006/main" showMasterSp="0">
+  <p:cSld>
+    <p:spTree>
+      <p:nvGrpSpPr>
+        <p:cNvPr id="1" name=""/>
+        <p:cNvGrpSpPr/>
+        <p:nvPr/>
+      </p:nvGrpSpPr>
+      <p:grpSpPr>
+        <a:xfrm>
+          <a:off x="0" y="0"/>
+          <a:ext cx="0" cy="0"/>
+          <a:chOff x="0" y="0"/>
+          <a:chExt cx="0" cy="0"/>
+        </a:xfrm>
+      </p:grpSpPr>
+      <p:sp>
+        <p:nvSpPr>
+          <p:cNvPr id="2" name="Title 1">
+            <a:extLst>
+              <a:ext uri="{FF2B5EF4-FFF2-40B4-BE49-F238E27FC236}">
+                <a16:creationId xmlns:a16="http://schemas.microsoft.com/office/drawing/2014/main" id="{4F300BB8-847C-4C92-B89D-38047D4FC2EB}"/>
+              </a:ext>
+            </a:extLst>
+          </p:cNvPr>
+          <p:cNvSpPr>
+            <a:spLocks noGrp="1"/>
+          </p:cNvSpPr>
+          <p:nvPr>
+            <p:ph type="title"/>
+          </p:nvPr>
+        </p:nvSpPr>
+        <p:spPr/>
+        <p:txBody>
+          <a:bodyPr/>
+          <a:lstStyle/>
+          <a:p>
+            <a:r>
+              <a:rPr lang="en-US" dirty="0"/>
+              <a:t>Existing Competitors</a:t>
+            </a:r>
+          </a:p>
+        </p:txBody>
+      </p:sp>
+    </p:spTree>
+    <p:extLst>
+      <p:ext uri="{BB962C8B-B14F-4D97-AF65-F5344CB8AC3E}">
+        <p14:creationId xmlns:p14="http://schemas.microsoft.com/office/powerpoint/2010/main" val="3836715830"/>
+      </p:ext>
+    </p:extLst>
+  </p:cSld>
+  <p:clrMapOvr>
+    <a:masterClrMapping/>
+  </p:clrMapOvr>
+</p:sld>
+</file>
+
 <file path=ppt/slides/slide2.xml><?xml version="1.0" encoding="utf-8"?>
 <p:sld xmlns:a="http://schemas.openxmlformats.org/drawingml/2006/main" xmlns:r="http://schemas.openxmlformats.org/officeDocument/2006/relationships" xmlns:p="http://schemas.openxmlformats.org/presentationml/2006/main" showMasterSp="0">
   <p:cSld>
@@ -4573,15 +4789,7 @@
           <a:p>
             <a:r>
               <a:rPr lang="en-US" dirty="0"/>
-              <a:t>Outline … </a:t>
-            </a:r>
-            <a:r>
-              <a:rPr lang="en-US" dirty="0" err="1"/>
-              <a:t>w.i.p</a:t>
-            </a:r>
-            <a:r>
-              <a:rPr lang="en-US" dirty="0"/>
-              <a:t>.</a:t>
+              <a:t>Project Outline</a:t>
             </a:r>
           </a:p>
         </p:txBody>
@@ -5105,64 +5313,6 @@
           <p:cNvPr id="2" name="Title 1">
             <a:extLst>
               <a:ext uri="{FF2B5EF4-FFF2-40B4-BE49-F238E27FC236}">
-                <a16:creationId xmlns:a16="http://schemas.microsoft.com/office/drawing/2014/main" id="{4F300BB8-847C-4C92-B89D-38047D4FC2EB}"/>
-              </a:ext>
-            </a:extLst>
-          </p:cNvPr>
-          <p:cNvSpPr>
-            <a:spLocks noGrp="1"/>
-          </p:cNvSpPr>
-          <p:nvPr>
-            <p:ph type="title"/>
-          </p:nvPr>
-        </p:nvSpPr>
-        <p:spPr/>
-        <p:txBody>
-          <a:bodyPr/>
-          <a:lstStyle/>
-          <a:p>
-            <a:r>
-              <a:rPr lang="en-US" dirty="0"/>
-              <a:t>Existing Competitors</a:t>
-            </a:r>
-          </a:p>
-        </p:txBody>
-      </p:sp>
-    </p:spTree>
-    <p:extLst>
-      <p:ext uri="{BB962C8B-B14F-4D97-AF65-F5344CB8AC3E}">
-        <p14:creationId xmlns:p14="http://schemas.microsoft.com/office/powerpoint/2010/main" val="3836715830"/>
-      </p:ext>
-    </p:extLst>
-  </p:cSld>
-  <p:clrMapOvr>
-    <a:masterClrMapping/>
-  </p:clrMapOvr>
-</p:sld>
-</file>
-
-<file path=ppt/slides/slide5.xml><?xml version="1.0" encoding="utf-8"?>
-<p:sld xmlns:a="http://schemas.openxmlformats.org/drawingml/2006/main" xmlns:r="http://schemas.openxmlformats.org/officeDocument/2006/relationships" xmlns:p="http://schemas.openxmlformats.org/presentationml/2006/main" showMasterSp="0">
-  <p:cSld>
-    <p:spTree>
-      <p:nvGrpSpPr>
-        <p:cNvPr id="1" name=""/>
-        <p:cNvGrpSpPr/>
-        <p:nvPr/>
-      </p:nvGrpSpPr>
-      <p:grpSpPr>
-        <a:xfrm>
-          <a:off x="0" y="0"/>
-          <a:ext cx="0" cy="0"/>
-          <a:chOff x="0" y="0"/>
-          <a:chExt cx="0" cy="0"/>
-        </a:xfrm>
-      </p:grpSpPr>
-      <p:sp>
-        <p:nvSpPr>
-          <p:cNvPr id="2" name="Title 1">
-            <a:extLst>
-              <a:ext uri="{FF2B5EF4-FFF2-40B4-BE49-F238E27FC236}">
                 <a16:creationId xmlns:a16="http://schemas.microsoft.com/office/drawing/2014/main" id="{75AC86D3-8FD1-4F47-A319-7D0542E48B2F}"/>
               </a:ext>
             </a:extLst>
@@ -5329,31 +5479,6 @@
               <a:buChar char="•"/>
             </a:pPr>
             <a:endParaRPr lang="en-US" dirty="0"/>
-          </a:p>
-          <a:p>
-            <a:pPr algn="l" fontAlgn="base"/>
-            <a:r>
-              <a:rPr lang="en-US" b="0" i="0" dirty="0">
-                <a:effectLst/>
-                <a:latin typeface="Segoe UI" panose="020B0502040204020203" pitchFamily="34" charset="0"/>
-                <a:hlinkClick r:id="rId2"/>
-              </a:rPr>
-              <a:t>Language Understanding (LUIS)</a:t>
-            </a:r>
-            <a:endParaRPr lang="en-US" b="0" i="0" dirty="0">
-              <a:effectLst/>
-              <a:latin typeface="Segoe UI" panose="020B0502040204020203" pitchFamily="34" charset="0"/>
-            </a:endParaRPr>
-          </a:p>
-          <a:p>
-            <a:pPr algn="l" fontAlgn="base"/>
-            <a:r>
-              <a:rPr lang="en-US" b="0" i="0" dirty="0">
-                <a:effectLst/>
-                <a:latin typeface="Segoe UI" panose="020B0502040204020203" pitchFamily="34" charset="0"/>
-              </a:rPr>
-              <a:t>A machine learning-based service to build natural language into apps, bots, and IoT devices. Quickly create enterprise-ready, custom models that continuously improve.</a:t>
-            </a:r>
           </a:p>
           <a:p>
             <a:endParaRPr lang="en-US" dirty="0"/>
@@ -5373,7 +5498,7 @@
 </p:sld>
 </file>
 
-<file path=ppt/slides/slide6.xml><?xml version="1.0" encoding="utf-8"?>
+<file path=ppt/slides/slide5.xml><?xml version="1.0" encoding="utf-8"?>
 <p:sld xmlns:a="http://schemas.openxmlformats.org/drawingml/2006/main" xmlns:r="http://schemas.openxmlformats.org/officeDocument/2006/relationships" xmlns:p="http://schemas.openxmlformats.org/presentationml/2006/main">
   <p:cSld>
     <p:spTree>
@@ -5419,10 +5544,9 @@
           <a:lstStyle/>
           <a:p>
             <a:r>
-              <a:rPr lang="en-US"/>
-              <a:t>Task decomposition</a:t>
-            </a:r>
-            <a:endParaRPr lang="en-US" dirty="0"/>
+              <a:rPr lang="en-US" dirty="0"/>
+              <a:t>Project Breakdown</a:t>
+            </a:r>
           </a:p>
         </p:txBody>
       </p:sp>
@@ -5469,7 +5593,7 @@
 </p:sld>
 </file>
 
-<file path=ppt/slides/slide7.xml><?xml version="1.0" encoding="utf-8"?>
+<file path=ppt/slides/slide6.xml><?xml version="1.0" encoding="utf-8"?>
 <p:sld xmlns:a="http://schemas.openxmlformats.org/drawingml/2006/main" xmlns:r="http://schemas.openxmlformats.org/officeDocument/2006/relationships" xmlns:p="http://schemas.openxmlformats.org/presentationml/2006/main">
   <p:cSld>
     <p:spTree>
@@ -5564,7 +5688,320 @@
 </p:sld>
 </file>
 
+<file path=ppt/slides/slide7.xml><?xml version="1.0" encoding="utf-8"?>
+<p:sld xmlns:a="http://schemas.openxmlformats.org/drawingml/2006/main" xmlns:r="http://schemas.openxmlformats.org/officeDocument/2006/relationships" xmlns:p="http://schemas.openxmlformats.org/presentationml/2006/main">
+  <p:cSld>
+    <p:bg>
+      <p:bgPr>
+        <a:solidFill>
+          <a:schemeClr val="bg1"/>
+        </a:solidFill>
+        <a:effectLst/>
+      </p:bgPr>
+    </p:bg>
+    <p:spTree>
+      <p:nvGrpSpPr>
+        <p:cNvPr id="1" name=""/>
+        <p:cNvGrpSpPr/>
+        <p:nvPr/>
+      </p:nvGrpSpPr>
+      <p:grpSpPr>
+        <a:xfrm>
+          <a:off x="0" y="0"/>
+          <a:ext cx="0" cy="0"/>
+          <a:chOff x="0" y="0"/>
+          <a:chExt cx="0" cy="0"/>
+        </a:xfrm>
+      </p:grpSpPr>
+      <p:pic>
+        <p:nvPicPr>
+          <p:cNvPr id="1028" name="Picture 4">
+            <a:extLst>
+              <a:ext uri="{FF2B5EF4-FFF2-40B4-BE49-F238E27FC236}">
+                <a16:creationId xmlns:a16="http://schemas.microsoft.com/office/drawing/2014/main" id="{F8049BB3-ACA1-4E3A-A56A-8A74B3465D24}"/>
+              </a:ext>
+            </a:extLst>
+          </p:cNvPr>
+          <p:cNvPicPr>
+            <a:picLocks noChangeAspect="1" noChangeArrowheads="1"/>
+          </p:cNvPicPr>
+          <p:nvPr/>
+        </p:nvPicPr>
+        <p:blipFill rotWithShape="1">
+          <a:blip r:embed="rId3">
+            <a:extLst>
+              <a:ext uri="{28A0092B-C50C-407E-A947-70E740481C1C}">
+                <a14:useLocalDpi xmlns:a14="http://schemas.microsoft.com/office/drawing/2010/main" val="0"/>
+              </a:ext>
+            </a:extLst>
+          </a:blip>
+          <a:srcRect r="1608" b="2"/>
+          <a:stretch/>
+        </p:blipFill>
+        <p:spPr bwMode="auto">
+          <a:xfrm>
+            <a:off x="104676" y="1064984"/>
+            <a:ext cx="5809741" cy="5175504"/>
+          </a:xfrm>
+          <a:prstGeom prst="rect">
+            <a:avLst/>
+          </a:prstGeom>
+          <a:noFill/>
+          <a:extLst>
+            <a:ext uri="{909E8E84-426E-40DD-AFC4-6F175D3DCCD1}">
+              <a14:hiddenFill xmlns:a14="http://schemas.microsoft.com/office/drawing/2010/main">
+                <a:solidFill>
+                  <a:srgbClr val="FFFFFF"/>
+                </a:solidFill>
+              </a14:hiddenFill>
+            </a:ext>
+          </a:extLst>
+        </p:spPr>
+      </p:pic>
+      <p:pic>
+        <p:nvPicPr>
+          <p:cNvPr id="1026" name="Picture 2">
+            <a:extLst>
+              <a:ext uri="{FF2B5EF4-FFF2-40B4-BE49-F238E27FC236}">
+                <a16:creationId xmlns:a16="http://schemas.microsoft.com/office/drawing/2014/main" id="{16B71116-FD59-494D-9331-677ADF893FAA}"/>
+              </a:ext>
+            </a:extLst>
+          </p:cNvPr>
+          <p:cNvPicPr>
+            <a:picLocks noChangeAspect="1" noChangeArrowheads="1"/>
+          </p:cNvPicPr>
+          <p:nvPr/>
+        </p:nvPicPr>
+        <p:blipFill rotWithShape="1">
+          <a:blip r:embed="rId4">
+            <a:extLst>
+              <a:ext uri="{28A0092B-C50C-407E-A947-70E740481C1C}">
+                <a14:useLocalDpi xmlns:a14="http://schemas.microsoft.com/office/drawing/2010/main" val="0"/>
+              </a:ext>
+            </a:extLst>
+          </a:blip>
+          <a:srcRect l="1267" r="341" b="2"/>
+          <a:stretch/>
+        </p:blipFill>
+        <p:spPr bwMode="auto">
+          <a:xfrm>
+            <a:off x="6498076" y="0"/>
+            <a:ext cx="5431277" cy="5519953"/>
+          </a:xfrm>
+          <a:prstGeom prst="rect">
+            <a:avLst/>
+          </a:prstGeom>
+          <a:noFill/>
+          <a:extLst>
+            <a:ext uri="{909E8E84-426E-40DD-AFC4-6F175D3DCCD1}">
+              <a14:hiddenFill xmlns:a14="http://schemas.microsoft.com/office/drawing/2010/main">
+                <a:solidFill>
+                  <a:srgbClr val="FFFFFF"/>
+                </a:solidFill>
+              </a14:hiddenFill>
+            </a:ext>
+          </a:extLst>
+        </p:spPr>
+      </p:pic>
+      <p:sp>
+        <p:nvSpPr>
+          <p:cNvPr id="2" name="Title 1">
+            <a:extLst>
+              <a:ext uri="{FF2B5EF4-FFF2-40B4-BE49-F238E27FC236}">
+                <a16:creationId xmlns:a16="http://schemas.microsoft.com/office/drawing/2014/main" id="{548537EF-EEA4-4705-8B1B-E1D7DBF51D7B}"/>
+              </a:ext>
+            </a:extLst>
+          </p:cNvPr>
+          <p:cNvSpPr>
+            <a:spLocks noGrp="1"/>
+          </p:cNvSpPr>
+          <p:nvPr>
+            <p:ph type="title"/>
+          </p:nvPr>
+        </p:nvSpPr>
+        <p:spPr>
+          <a:xfrm>
+            <a:off x="-99222" y="0"/>
+            <a:ext cx="10058400" cy="795113"/>
+          </a:xfrm>
+        </p:spPr>
+        <p:txBody>
+          <a:bodyPr/>
+          <a:lstStyle/>
+          <a:p>
+            <a:r>
+              <a:rPr lang="en-US" dirty="0"/>
+              <a:t>Email Classification</a:t>
+            </a:r>
+          </a:p>
+        </p:txBody>
+      </p:sp>
+      <p:sp>
+        <p:nvSpPr>
+          <p:cNvPr id="3" name="Content Placeholder 2">
+            <a:extLst>
+              <a:ext uri="{FF2B5EF4-FFF2-40B4-BE49-F238E27FC236}">
+                <a16:creationId xmlns:a16="http://schemas.microsoft.com/office/drawing/2014/main" id="{B8B5328B-D77D-4D8A-82BA-2DF35AD8DD55}"/>
+              </a:ext>
+            </a:extLst>
+          </p:cNvPr>
+          <p:cNvSpPr>
+            <a:spLocks noGrp="1"/>
+          </p:cNvSpPr>
+          <p:nvPr>
+            <p:ph idx="1"/>
+          </p:nvPr>
+        </p:nvSpPr>
+        <p:spPr>
+          <a:xfrm>
+            <a:off x="3861883" y="5502210"/>
+            <a:ext cx="4124526" cy="681441"/>
+          </a:xfrm>
+        </p:spPr>
+        <p:txBody>
+          <a:bodyPr>
+            <a:normAutofit/>
+          </a:bodyPr>
+          <a:lstStyle/>
+          <a:p>
+            <a:r>
+              <a:rPr lang="en-US" dirty="0"/>
+              <a:t>Bayesian Hierarchical clustering (BHC)</a:t>
+            </a:r>
+          </a:p>
+        </p:txBody>
+      </p:sp>
+    </p:spTree>
+    <p:extLst>
+      <p:ext uri="{BB962C8B-B14F-4D97-AF65-F5344CB8AC3E}">
+        <p14:creationId xmlns:p14="http://schemas.microsoft.com/office/powerpoint/2010/main" val="3951480361"/>
+      </p:ext>
+    </p:extLst>
+  </p:cSld>
+  <p:clrMapOvr>
+    <a:masterClrMapping/>
+  </p:clrMapOvr>
+</p:sld>
+</file>
+
 <file path=ppt/slides/slide8.xml><?xml version="1.0" encoding="utf-8"?>
+<p:sld xmlns:a="http://schemas.openxmlformats.org/drawingml/2006/main" xmlns:r="http://schemas.openxmlformats.org/officeDocument/2006/relationships" xmlns:p="http://schemas.openxmlformats.org/presentationml/2006/main">
+  <p:cSld>
+    <p:spTree>
+      <p:nvGrpSpPr>
+        <p:cNvPr id="1" name=""/>
+        <p:cNvGrpSpPr/>
+        <p:nvPr/>
+      </p:nvGrpSpPr>
+      <p:grpSpPr>
+        <a:xfrm>
+          <a:off x="0" y="0"/>
+          <a:ext cx="0" cy="0"/>
+          <a:chOff x="0" y="0"/>
+          <a:chExt cx="0" cy="0"/>
+        </a:xfrm>
+      </p:grpSpPr>
+      <p:sp>
+        <p:nvSpPr>
+          <p:cNvPr id="2" name="Title 1">
+            <a:extLst>
+              <a:ext uri="{FF2B5EF4-FFF2-40B4-BE49-F238E27FC236}">
+                <a16:creationId xmlns:a16="http://schemas.microsoft.com/office/drawing/2014/main" id="{5706AB3D-3B41-42BC-8729-3B9532C4CBC0}"/>
+              </a:ext>
+            </a:extLst>
+          </p:cNvPr>
+          <p:cNvSpPr>
+            <a:spLocks noGrp="1"/>
+          </p:cNvSpPr>
+          <p:nvPr>
+            <p:ph type="title"/>
+          </p:nvPr>
+        </p:nvSpPr>
+        <p:spPr/>
+        <p:txBody>
+          <a:bodyPr/>
+          <a:lstStyle/>
+          <a:p>
+            <a:r>
+              <a:rPr lang="en-US" dirty="0"/>
+              <a:t>Conclusion</a:t>
+            </a:r>
+          </a:p>
+        </p:txBody>
+      </p:sp>
+      <p:sp>
+        <p:nvSpPr>
+          <p:cNvPr id="3" name="TextBox 2">
+            <a:extLst>
+              <a:ext uri="{FF2B5EF4-FFF2-40B4-BE49-F238E27FC236}">
+                <a16:creationId xmlns:a16="http://schemas.microsoft.com/office/drawing/2014/main" id="{2C3757FA-BCCD-4C6A-80A6-C513BA66AA22}"/>
+              </a:ext>
+            </a:extLst>
+          </p:cNvPr>
+          <p:cNvSpPr txBox="1"/>
+          <p:nvPr/>
+        </p:nvSpPr>
+        <p:spPr>
+          <a:xfrm>
+            <a:off x="2257425" y="2743200"/>
+            <a:ext cx="8188139" cy="1477328"/>
+          </a:xfrm>
+          <a:prstGeom prst="rect">
+            <a:avLst/>
+          </a:prstGeom>
+          <a:noFill/>
+        </p:spPr>
+        <p:txBody>
+          <a:bodyPr wrap="none" rtlCol="0">
+            <a:spAutoFit/>
+          </a:bodyPr>
+          <a:lstStyle/>
+          <a:p>
+            <a:r>
+              <a:rPr lang="en-US" dirty="0"/>
+              <a:t>This should be a bulleted list of what was done, what the next steps look like, </a:t>
+            </a:r>
+          </a:p>
+          <a:p>
+            <a:r>
+              <a:rPr lang="en-US" dirty="0"/>
+              <a:t>(maybe interesting points along the way) </a:t>
+            </a:r>
+          </a:p>
+          <a:p>
+            <a:r>
+              <a:rPr lang="en-US" dirty="0"/>
+              <a:t>and finally, a thank you! </a:t>
+            </a:r>
+          </a:p>
+          <a:p>
+            <a:r>
+              <a:rPr lang="en-US" dirty="0"/>
+              <a:t>	Thank Prof. Erdly, Dr. Marney, the UWB CSS dept, Kiera, and anyone else </a:t>
+            </a:r>
+          </a:p>
+          <a:p>
+            <a:r>
+              <a:rPr lang="en-US" dirty="0"/>
+              <a:t>	that conceivably contributed.</a:t>
+            </a:r>
+          </a:p>
+        </p:txBody>
+      </p:sp>
+    </p:spTree>
+    <p:extLst>
+      <p:ext uri="{BB962C8B-B14F-4D97-AF65-F5344CB8AC3E}">
+        <p14:creationId xmlns:p14="http://schemas.microsoft.com/office/powerpoint/2010/main" val="927017676"/>
+      </p:ext>
+    </p:extLst>
+  </p:cSld>
+  <p:clrMapOvr>
+    <a:masterClrMapping/>
+  </p:clrMapOvr>
+</p:sld>
+</file>
+
+<file path=ppt/slides/slide9.xml><?xml version="1.0" encoding="utf-8"?>
 <p:sld xmlns:a="http://schemas.openxmlformats.org/drawingml/2006/main" xmlns:r="http://schemas.openxmlformats.org/officeDocument/2006/relationships" xmlns:p="http://schemas.openxmlformats.org/presentationml/2006/main">
   <p:cSld>
     <p:spTree>
@@ -6328,6 +6765,15 @@
 </file>
 
 <file path=customXml/item1.xml><?xml version="1.0" encoding="utf-8"?>
+<p:properties xmlns:p="http://schemas.microsoft.com/office/2006/metadata/properties" xmlns:xsi="http://www.w3.org/2001/XMLSchema-instance" xmlns:pc="http://schemas.microsoft.com/office/infopath/2007/PartnerControls">
+  <documentManagement>
+    <Status xmlns="71af3243-3dd4-4a8d-8c0d-dd76da1f02a5">Not started</Status>
+    <MediaServiceKeyPoints xmlns="71af3243-3dd4-4a8d-8c0d-dd76da1f02a5" xsi:nil="true"/>
+  </documentManagement>
+</p:properties>
+</file>
+
+<file path=customXml/item2.xml><?xml version="1.0" encoding="utf-8"?>
 <ct:contentTypeSchema xmlns:ct="http://schemas.microsoft.com/office/2006/metadata/contentType" xmlns:ma="http://schemas.microsoft.com/office/2006/metadata/properties/metaAttributes" ct:_="" ma:_="" ma:contentTypeName="Document" ma:contentTypeID="0x01010079F111ED35F8CC479449609E8A0923A6" ma:contentTypeVersion="12" ma:contentTypeDescription="Create a new document." ma:contentTypeScope="" ma:versionID="a410dd7f93c95333ffa1b60ed6adedd1">
   <xsd:schema xmlns:xsd="http://www.w3.org/2001/XMLSchema" xmlns:xs="http://www.w3.org/2001/XMLSchema" xmlns:p="http://schemas.microsoft.com/office/2006/metadata/properties" xmlns:ns2="71af3243-3dd4-4a8d-8c0d-dd76da1f02a5" xmlns:ns3="16c05727-aa75-4e4a-9b5f-8a80a1165891" targetNamespace="http://schemas.microsoft.com/office/2006/metadata/properties" ma:root="true" ma:fieldsID="a936d9baba76aa3866493feff160faab" ns2:_="" ns3:_="">
     <xsd:import namespace="71af3243-3dd4-4a8d-8c0d-dd76da1f02a5"/>
@@ -6548,7 +6994,7 @@
 </ct:contentTypeSchema>
 </file>
 
-<file path=customXml/item2.xml><?xml version="1.0" encoding="utf-8"?>
+<file path=customXml/item3.xml><?xml version="1.0" encoding="utf-8"?>
 <?mso-contentType ?>
 <FormTemplates xmlns="http://schemas.microsoft.com/sharepoint/v3/contenttype/forms">
   <Display>DocumentLibraryForm</Display>
@@ -6557,16 +7003,17 @@
 </FormTemplates>
 </file>
 
-<file path=customXml/item3.xml><?xml version="1.0" encoding="utf-8"?>
-<p:properties xmlns:p="http://schemas.microsoft.com/office/2006/metadata/properties" xmlns:xsi="http://www.w3.org/2001/XMLSchema-instance" xmlns:pc="http://schemas.microsoft.com/office/infopath/2007/PartnerControls">
-  <documentManagement>
-    <Status xmlns="71af3243-3dd4-4a8d-8c0d-dd76da1f02a5">Not started</Status>
-    <MediaServiceKeyPoints xmlns="71af3243-3dd4-4a8d-8c0d-dd76da1f02a5" xsi:nil="true"/>
-  </documentManagement>
-</p:properties>
+<file path=customXml/itemProps1.xml><?xml version="1.0" encoding="utf-8"?>
+<ds:datastoreItem xmlns:ds="http://schemas.openxmlformats.org/officeDocument/2006/customXml" ds:itemID="{A03EEFF0-FB57-4CB4-8BFC-DF397689E2ED}">
+  <ds:schemaRefs>
+    <ds:schemaRef ds:uri="http://schemas.microsoft.com/office/2006/metadata/properties"/>
+    <ds:schemaRef ds:uri="http://schemas.microsoft.com/office/infopath/2007/PartnerControls"/>
+    <ds:schemaRef ds:uri="71af3243-3dd4-4a8d-8c0d-dd76da1f02a5"/>
+  </ds:schemaRefs>
+</ds:datastoreItem>
 </file>
 
-<file path=customXml/itemProps1.xml><?xml version="1.0" encoding="utf-8"?>
+<file path=customXml/itemProps2.xml><?xml version="1.0" encoding="utf-8"?>
 <ds:datastoreItem xmlns:ds="http://schemas.openxmlformats.org/officeDocument/2006/customXml" ds:itemID="{93932EF5-314F-409E-8020-FEE5FA0795B9}">
   <ds:schemaRefs>
     <ds:schemaRef ds:uri="http://schemas.microsoft.com/office/2006/metadata/contentType"/>
@@ -6585,20 +7032,10 @@
 </ds:datastoreItem>
 </file>
 
-<file path=customXml/itemProps2.xml><?xml version="1.0" encoding="utf-8"?>
+<file path=customXml/itemProps3.xml><?xml version="1.0" encoding="utf-8"?>
 <ds:datastoreItem xmlns:ds="http://schemas.openxmlformats.org/officeDocument/2006/customXml" ds:itemID="{AA3F7EDC-E5B4-4BBC-9D2A-CBE6D46C37AD}">
   <ds:schemaRefs>
     <ds:schemaRef ds:uri="http://schemas.microsoft.com/sharepoint/v3/contenttype/forms"/>
   </ds:schemaRefs>
 </ds:datastoreItem>
-</file>
-
-<file path=customXml/itemProps3.xml><?xml version="1.0" encoding="utf-8"?>
-<ds:datastoreItem xmlns:ds="http://schemas.openxmlformats.org/officeDocument/2006/customXml" ds:itemID="{A03EEFF0-FB57-4CB4-8BFC-DF397689E2ED}">
-  <ds:schemaRefs>
-    <ds:schemaRef ds:uri="http://schemas.microsoft.com/office/2006/metadata/properties"/>
-    <ds:schemaRef ds:uri="http://schemas.microsoft.com/office/infopath/2007/PartnerControls"/>
-    <ds:schemaRef ds:uri="71af3243-3dd4-4a8d-8c0d-dd76da1f02a5"/>
-  </ds:schemaRefs>
-</ds:datastoreItem>
 </file>
</xml_diff>